<commit_message>
update ppt and button
</commit_message>
<xml_diff>
--- a/docs/BookLook PPT.pptx
+++ b/docs/BookLook PPT.pptx
@@ -5423,8 +5423,8 @@
         </p:nvSpPr>
         <p:spPr>
           <a:xfrm>
-            <a:off x="915666" y="1790314"/>
-            <a:ext cx="1740877" cy="276999"/>
+            <a:off x="915666" y="1762588"/>
+            <a:ext cx="2140894" cy="307777"/>
           </a:xfrm>
           <a:prstGeom prst="rect">
             <a:avLst/>
@@ -5437,7 +5437,7 @@
           <a:lstStyle/>
           <a:p>
             <a:r>
-              <a:rPr lang="en-US" sz="1200" b="1" dirty="0">
+              <a:rPr lang="en-US" sz="1400" b="1" dirty="0">
                 <a:solidFill>
                   <a:schemeClr val="tx1">
                     <a:lumMod val="75000"/>
@@ -5447,9 +5447,9 @@
                 <a:effectLst/>
                 <a:latin typeface="Bahnschrift Light" panose="020B0502040204020203" pitchFamily="34" charset="0"/>
               </a:rPr>
-              <a:t>LOGO BUKU TERBUKA</a:t>
-            </a:r>
-            <a:endParaRPr lang="en-US" sz="1050" b="1" dirty="0">
+              <a:t>LOGO  BUKU  TERBUKA</a:t>
+            </a:r>
+            <a:endParaRPr lang="en-US" sz="1100" b="1" dirty="0">
               <a:solidFill>
                 <a:schemeClr val="tx1">
                   <a:lumMod val="75000"/>
@@ -5476,7 +5476,7 @@
         </p:nvSpPr>
         <p:spPr>
           <a:xfrm>
-            <a:off x="915666" y="2044856"/>
+            <a:off x="915666" y="2066559"/>
             <a:ext cx="2609156" cy="1731243"/>
           </a:xfrm>
           <a:prstGeom prst="rect">
@@ -6668,7 +6668,7 @@
                 </a:solidFill>
                 <a:latin typeface="Bahnschrift Light" panose="020B0502040204020203" pitchFamily="34" charset="0"/>
               </a:rPr>
-              <a:t> </a:t>
+              <a:t> di </a:t>
             </a:r>
             <a:r>
               <a:rPr lang="en-US" sz="1200" b="1" dirty="0" err="1">
@@ -6680,7 +6680,7 @@
                 </a:solidFill>
                 <a:latin typeface="Bahnschrift Light" panose="020B0502040204020203" pitchFamily="34" charset="0"/>
               </a:rPr>
-              <a:t>dimanapun</a:t>
+              <a:t>manapun</a:t>
             </a:r>
             <a:r>
               <a:rPr lang="en-US" sz="1200" b="1" dirty="0">
@@ -8117,7 +8117,7 @@
                 </a:solidFill>
                 <a:latin typeface="Raleway"/>
               </a:rPr>
-              <a:t>terauthentikasi</a:t>
+              <a:t>terautentikasi</a:t>
             </a:r>
             <a:endParaRPr lang="en-US" b="0" dirty="0">
               <a:solidFill>
@@ -8877,7 +8877,7 @@
         </p:blipFill>
         <p:spPr>
           <a:xfrm>
-            <a:off x="3360335" y="440073"/>
+            <a:off x="3427312" y="437206"/>
             <a:ext cx="576728" cy="576728"/>
           </a:xfrm>
           <a:prstGeom prst="rect">
@@ -10266,7 +10266,7 @@
                 </a:solidFill>
                 <a:latin typeface="Raleway"/>
               </a:rPr>
-              <a:t>terauthentikasi</a:t>
+              <a:t>terautentikasi</a:t>
             </a:r>
             <a:endParaRPr lang="en-US" b="0" dirty="0">
               <a:solidFill>
@@ -11041,7 +11041,7 @@
         </p:nvSpPr>
         <p:spPr>
           <a:xfrm>
-            <a:off x="2847682" y="3489630"/>
+            <a:off x="3386235" y="2572754"/>
             <a:ext cx="2178762" cy="523220"/>
           </a:xfrm>
           <a:prstGeom prst="rect">
@@ -11118,7 +11118,7 @@
         </p:nvSpPr>
         <p:spPr>
           <a:xfrm>
-            <a:off x="3072367" y="2664168"/>
+            <a:off x="2534661" y="3493437"/>
             <a:ext cx="1679065" cy="338554"/>
           </a:xfrm>
           <a:prstGeom prst="rect">
@@ -11841,7 +11841,7 @@
         </p:blipFill>
         <p:spPr bwMode="auto">
           <a:xfrm>
-            <a:off x="2528439" y="2652987"/>
+            <a:off x="1990733" y="3482256"/>
             <a:ext cx="446478" cy="446478"/>
           </a:xfrm>
           <a:prstGeom prst="rect">
@@ -11895,7 +11895,7 @@
         </p:blipFill>
         <p:spPr bwMode="auto">
           <a:xfrm>
-            <a:off x="2234751" y="3570219"/>
+            <a:off x="2754400" y="2592311"/>
             <a:ext cx="448408" cy="448408"/>
           </a:xfrm>
           <a:prstGeom prst="rect">
@@ -12513,7 +12513,7 @@
                                           </p:stCondLst>
                                         </p:cTn>
                                         <p:tgtEl>
-                                          <p:spTgt spid="1040"/>
+                                          <p:spTgt spid="1038"/>
                                         </p:tgtEl>
                                         <p:attrNameLst>
                                           <p:attrName>style.visibility</p:attrName>
@@ -12527,7 +12527,7 @@
                                       <p:cBhvr>
                                         <p:cTn id="34" dur="500"/>
                                         <p:tgtEl>
-                                          <p:spTgt spid="1040"/>
+                                          <p:spTgt spid="1038"/>
                                         </p:tgtEl>
                                       </p:cBhvr>
                                     </p:animEffect>
@@ -12535,7 +12535,7 @@
                                       <p:cBhvr>
                                         <p:cTn id="35" dur="500" fill="hold"/>
                                         <p:tgtEl>
-                                          <p:spTgt spid="1040"/>
+                                          <p:spTgt spid="1038"/>
                                         </p:tgtEl>
                                         <p:attrNameLst>
                                           <p:attrName>ppt_x</p:attrName>
@@ -12558,7 +12558,7 @@
                                       <p:cBhvr>
                                         <p:cTn id="36" dur="500" fill="hold"/>
                                         <p:tgtEl>
-                                          <p:spTgt spid="1040"/>
+                                          <p:spTgt spid="1038"/>
                                         </p:tgtEl>
                                         <p:attrNameLst>
                                           <p:attrName>ppt_y</p:attrName>
@@ -12594,7 +12594,7 @@
                                           </p:stCondLst>
                                         </p:cTn>
                                         <p:tgtEl>
-                                          <p:spTgt spid="38"/>
+                                          <p:spTgt spid="32"/>
                                         </p:tgtEl>
                                         <p:attrNameLst>
                                           <p:attrName>style.visibility</p:attrName>
@@ -12608,7 +12608,7 @@
                                       <p:cBhvr>
                                         <p:cTn id="39" dur="500"/>
                                         <p:tgtEl>
-                                          <p:spTgt spid="38"/>
+                                          <p:spTgt spid="32"/>
                                         </p:tgtEl>
                                       </p:cBhvr>
                                     </p:animEffect>
@@ -12616,7 +12616,7 @@
                                       <p:cBhvr>
                                         <p:cTn id="40" dur="500" fill="hold"/>
                                         <p:tgtEl>
-                                          <p:spTgt spid="38"/>
+                                          <p:spTgt spid="32"/>
                                         </p:tgtEl>
                                         <p:attrNameLst>
                                           <p:attrName>ppt_x</p:attrName>
@@ -12639,7 +12639,7 @@
                                       <p:cBhvr>
                                         <p:cTn id="41" dur="500" fill="hold"/>
                                         <p:tgtEl>
-                                          <p:spTgt spid="38"/>
+                                          <p:spTgt spid="32"/>
                                         </p:tgtEl>
                                         <p:attrNameLst>
                                           <p:attrName>ppt_y</p:attrName>
@@ -12675,7 +12675,7 @@
                                           </p:stCondLst>
                                         </p:cTn>
                                         <p:tgtEl>
-                                          <p:spTgt spid="32"/>
+                                          <p:spTgt spid="39"/>
                                         </p:tgtEl>
                                         <p:attrNameLst>
                                           <p:attrName>style.visibility</p:attrName>
@@ -12689,7 +12689,7 @@
                                       <p:cBhvr>
                                         <p:cTn id="44" dur="500"/>
                                         <p:tgtEl>
-                                          <p:spTgt spid="32"/>
+                                          <p:spTgt spid="39"/>
                                         </p:tgtEl>
                                       </p:cBhvr>
                                     </p:animEffect>
@@ -12697,7 +12697,7 @@
                                       <p:cBhvr>
                                         <p:cTn id="45" dur="500" fill="hold"/>
                                         <p:tgtEl>
-                                          <p:spTgt spid="32"/>
+                                          <p:spTgt spid="39"/>
                                         </p:tgtEl>
                                         <p:attrNameLst>
                                           <p:attrName>ppt_x</p:attrName>
@@ -12720,7 +12720,7 @@
                                       <p:cBhvr>
                                         <p:cTn id="46" dur="500" fill="hold"/>
                                         <p:tgtEl>
-                                          <p:spTgt spid="32"/>
+                                          <p:spTgt spid="39"/>
                                         </p:tgtEl>
                                         <p:attrNameLst>
                                           <p:attrName>ppt_y</p:attrName>
@@ -12774,7 +12774,7 @@
                                           </p:stCondLst>
                                         </p:cTn>
                                         <p:tgtEl>
-                                          <p:spTgt spid="1038"/>
+                                          <p:spTgt spid="1040"/>
                                         </p:tgtEl>
                                         <p:attrNameLst>
                                           <p:attrName>style.visibility</p:attrName>
@@ -12788,7 +12788,7 @@
                                       <p:cBhvr>
                                         <p:cTn id="51" dur="500"/>
                                         <p:tgtEl>
-                                          <p:spTgt spid="1038"/>
+                                          <p:spTgt spid="1040"/>
                                         </p:tgtEl>
                                       </p:cBhvr>
                                     </p:animEffect>
@@ -12796,7 +12796,7 @@
                                       <p:cBhvr>
                                         <p:cTn id="52" dur="500" fill="hold"/>
                                         <p:tgtEl>
-                                          <p:spTgt spid="1038"/>
+                                          <p:spTgt spid="1040"/>
                                         </p:tgtEl>
                                         <p:attrNameLst>
                                           <p:attrName>ppt_x</p:attrName>
@@ -12819,7 +12819,7 @@
                                       <p:cBhvr>
                                         <p:cTn id="53" dur="500" fill="hold"/>
                                         <p:tgtEl>
-                                          <p:spTgt spid="1038"/>
+                                          <p:spTgt spid="1040"/>
                                         </p:tgtEl>
                                         <p:attrNameLst>
                                           <p:attrName>ppt_y</p:attrName>
@@ -12855,7 +12855,7 @@
                                           </p:stCondLst>
                                         </p:cTn>
                                         <p:tgtEl>
-                                          <p:spTgt spid="39"/>
+                                          <p:spTgt spid="38"/>
                                         </p:tgtEl>
                                         <p:attrNameLst>
                                           <p:attrName>style.visibility</p:attrName>
@@ -12869,7 +12869,7 @@
                                       <p:cBhvr>
                                         <p:cTn id="56" dur="500"/>
                                         <p:tgtEl>
-                                          <p:spTgt spid="39"/>
+                                          <p:spTgt spid="38"/>
                                         </p:tgtEl>
                                       </p:cBhvr>
                                     </p:animEffect>
@@ -12877,7 +12877,7 @@
                                       <p:cBhvr>
                                         <p:cTn id="57" dur="500" fill="hold"/>
                                         <p:tgtEl>
-                                          <p:spTgt spid="39"/>
+                                          <p:spTgt spid="38"/>
                                         </p:tgtEl>
                                         <p:attrNameLst>
                                           <p:attrName>ppt_x</p:attrName>
@@ -12900,7 +12900,7 @@
                                       <p:cBhvr>
                                         <p:cTn id="58" dur="500" fill="hold"/>
                                         <p:tgtEl>
-                                          <p:spTgt spid="39"/>
+                                          <p:spTgt spid="38"/>
                                         </p:tgtEl>
                                         <p:attrNameLst>
                                           <p:attrName>ppt_y</p:attrName>
@@ -19054,7 +19054,7 @@
         </p:blipFill>
         <p:spPr>
           <a:xfrm>
-            <a:off x="1071160" y="634851"/>
+            <a:off x="1293897" y="500356"/>
             <a:ext cx="9520125" cy="5763885"/>
           </a:xfrm>
           <a:prstGeom prst="rect">

</xml_diff>